<commit_message>
presentation almost final but without the crucial bits so I dunno
</commit_message>
<xml_diff>
--- a/presentation.pptx
+++ b/presentation.pptx
@@ -19,23 +19,24 @@
     <p:sldId id="264" r:id="rId14"/>
     <p:sldId id="265" r:id="rId15"/>
     <p:sldId id="266" r:id="rId16"/>
+    <p:sldId id="267" r:id="rId17"/>
   </p:sldIdLst>
   <p:sldSz cy="5143500" cx="9144000"/>
   <p:notesSz cx="6858000" cy="9144000"/>
   <p:embeddedFontLst>
     <p:embeddedFont>
       <p:font typeface="Raleway"/>
-      <p:regular r:id="rId17"/>
-      <p:bold r:id="rId18"/>
-      <p:italic r:id="rId19"/>
-      <p:boldItalic r:id="rId20"/>
+      <p:regular r:id="rId18"/>
+      <p:bold r:id="rId19"/>
+      <p:italic r:id="rId20"/>
+      <p:boldItalic r:id="rId21"/>
     </p:embeddedFont>
     <p:embeddedFont>
       <p:font typeface="Source Sans Pro"/>
-      <p:regular r:id="rId21"/>
-      <p:bold r:id="rId22"/>
-      <p:italic r:id="rId23"/>
-      <p:boldItalic r:id="rId24"/>
+      <p:regular r:id="rId22"/>
+      <p:bold r:id="rId23"/>
+      <p:italic r:id="rId24"/>
+      <p:boldItalic r:id="rId25"/>
     </p:embeddedFont>
   </p:embeddedFontLst>
   <p:defaultTextStyle>
@@ -1072,6 +1073,105 @@
 </p:notes>
 </file>
 
+<file path=ppt/notesSlides/notesSlide12.xml><?xml version="1.0" encoding="utf-8"?>
+<p:notes xmlns:a="http://schemas.openxmlformats.org/drawingml/2006/main" xmlns:r="http://schemas.openxmlformats.org/officeDocument/2006/relationships" xmlns:mc="http://schemas.openxmlformats.org/markup-compatibility/2006" xmlns:mv="urn:schemas-microsoft-com:mac:vml" xmlns:p="http://schemas.openxmlformats.org/presentationml/2006/main" xmlns:c="http://schemas.openxmlformats.org/drawingml/2006/chart" xmlns:dgm="http://schemas.openxmlformats.org/drawingml/2006/diagram" xmlns:o="urn:schemas-microsoft-com:office:office" xmlns:v="urn:schemas-microsoft-com:vml" xmlns:pvml="urn:schemas-microsoft-com:office:powerpoint" xmlns:com="http://schemas.openxmlformats.org/drawingml/2006/compatibility" xmlns:p14="http://schemas.microsoft.com/office/powerpoint/2010/main" xmlns:p15="http://schemas.microsoft.com/office/powerpoint/2012/main" showMasterPhAnim="0" showMasterSp="0">
+  <p:cSld>
+    <p:spTree>
+      <p:nvGrpSpPr>
+        <p:cNvPr id="122" name="Shape 122"/>
+        <p:cNvGrpSpPr/>
+        <p:nvPr/>
+      </p:nvGrpSpPr>
+      <p:grpSpPr>
+        <a:xfrm>
+          <a:off x="0" y="0"/>
+          <a:ext cx="0" cy="0"/>
+          <a:chOff x="0" y="0"/>
+          <a:chExt cx="0" cy="0"/>
+        </a:xfrm>
+      </p:grpSpPr>
+      <p:sp>
+        <p:nvSpPr>
+          <p:cNvPr id="123" name="Google Shape;123;g655a93f9c3_0_477:notes"/>
+          <p:cNvSpPr/>
+          <p:nvPr>
+            <p:ph idx="2" type="sldImg"/>
+          </p:nvPr>
+        </p:nvSpPr>
+        <p:spPr>
+          <a:xfrm>
+            <a:off x="381300" y="685800"/>
+            <a:ext cx="6096000" cy="3429000"/>
+          </a:xfrm>
+          <a:custGeom>
+            <a:rect b="b" l="l" r="r" t="t"/>
+            <a:pathLst>
+              <a:path extrusionOk="0" h="120000" w="120000">
+                <a:moveTo>
+                  <a:pt x="0" y="0"/>
+                </a:moveTo>
+                <a:lnTo>
+                  <a:pt x="120000" y="0"/>
+                </a:lnTo>
+                <a:lnTo>
+                  <a:pt x="120000" y="120000"/>
+                </a:lnTo>
+                <a:lnTo>
+                  <a:pt x="0" y="120000"/>
+                </a:lnTo>
+                <a:close/>
+              </a:path>
+            </a:pathLst>
+          </a:custGeom>
+        </p:spPr>
+      </p:sp>
+      <p:sp>
+        <p:nvSpPr>
+          <p:cNvPr id="124" name="Google Shape;124;g655a93f9c3_0_477:notes"/>
+          <p:cNvSpPr txBox="1"/>
+          <p:nvPr>
+            <p:ph idx="1" type="body"/>
+          </p:nvPr>
+        </p:nvSpPr>
+        <p:spPr>
+          <a:xfrm>
+            <a:off x="685800" y="4343400"/>
+            <a:ext cx="5486400" cy="4114800"/>
+          </a:xfrm>
+          <a:prstGeom prst="rect">
+            <a:avLst/>
+          </a:prstGeom>
+        </p:spPr>
+        <p:txBody>
+          <a:bodyPr anchorCtr="0" anchor="t" bIns="91425" lIns="91425" spcFirstLastPara="1" rIns="91425" wrap="square" tIns="91425">
+            <a:noAutofit/>
+          </a:bodyPr>
+          <a:lstStyle/>
+          <a:p>
+            <a:pPr indent="0" lvl="0" marL="0" rtl="0" algn="l">
+              <a:spcBef>
+                <a:spcPts val="0"/>
+              </a:spcBef>
+              <a:spcAft>
+                <a:spcPts val="0"/>
+              </a:spcAft>
+              <a:buNone/>
+            </a:pPr>
+            <a:r>
+              <a:t/>
+            </a:r>
+            <a:endParaRPr/>
+          </a:p>
+        </p:txBody>
+      </p:sp>
+    </p:spTree>
+  </p:cSld>
+  <p:clrMapOvr>
+    <a:masterClrMapping/>
+  </p:clrMapOvr>
+</p:notes>
+</file>
+
 <file path=ppt/notesSlides/notesSlide2.xml><?xml version="1.0" encoding="utf-8"?>
 <p:notes xmlns:a="http://schemas.openxmlformats.org/drawingml/2006/main" xmlns:r="http://schemas.openxmlformats.org/officeDocument/2006/relationships" xmlns:mc="http://schemas.openxmlformats.org/markup-compatibility/2006" xmlns:mv="urn:schemas-microsoft-com:mac:vml" xmlns:p="http://schemas.openxmlformats.org/presentationml/2006/main" xmlns:c="http://schemas.openxmlformats.org/drawingml/2006/chart" xmlns:dgm="http://schemas.openxmlformats.org/drawingml/2006/diagram" xmlns:o="urn:schemas-microsoft-com:office:office" xmlns:v="urn:schemas-microsoft-com:vml" xmlns:pvml="urn:schemas-microsoft-com:office:powerpoint" xmlns:com="http://schemas.openxmlformats.org/drawingml/2006/compatibility" xmlns:p14="http://schemas.microsoft.com/office/powerpoint/2010/main" xmlns:p15="http://schemas.microsoft.com/office/powerpoint/2012/main" showMasterPhAnim="0" showMasterSp="0">
   <p:cSld>
@@ -6539,6 +6639,18 @@
     <p:sldLayoutId id="2147483657" r:id="rId10"/>
     <p:sldLayoutId id="2147483658" r:id="rId11"/>
   </p:sldLayoutIdLst>
+  <mc:AlternateContent>
+    <mc:Choice Requires="p14">
+      <p:transition spd="slow" p14:dur="1000">
+        <p:push dir="r"/>
+      </p:transition>
+    </mc:Choice>
+    <mc:Fallback>
+      <p:transition spd="slow">
+        <p:fade/>
+      </p:transition>
+    </mc:Fallback>
+  </mc:AlternateContent>
   <p:hf dt="0" ftr="0" hdr="0" sldNum="0"/>
   <p:txStyles>
     <p:titleStyle>
@@ -7486,7 +7598,7 @@
             </a:pPr>
             <a:r>
               <a:rPr lang="en-GB" sz="2400"/>
-              <a:t>To be thought through and implemented… but</a:t>
+              <a:t>To be thought through and implemented… but </a:t>
             </a:r>
             <a:endParaRPr sz="2400"/>
           </a:p>
@@ -7503,7 +7615,7 @@
             </a:pPr>
             <a:r>
               <a:rPr lang="en-GB" sz="2400"/>
-              <a:t>Languages could be implemented by changing the description accordingly</a:t>
+              <a:t>Using different languages could be addressed by changing the description accordingly</a:t>
             </a:r>
             <a:endParaRPr sz="2400"/>
           </a:p>
@@ -7520,7 +7632,23 @@
             </a:pPr>
             <a:r>
               <a:rPr lang="en-GB" sz="2400"/>
-              <a:t>We can have alternative description for younger people i.e. simplified or with more appropriate links</a:t>
+              <a:t>Alternative description could be shown for groups such as children so it is simplified or with more appropriate links</a:t>
+            </a:r>
+            <a:endParaRPr sz="2400"/>
+          </a:p>
+          <a:p>
+            <a:pPr indent="0" lvl="0" marL="0" rtl="0" algn="l">
+              <a:spcBef>
+                <a:spcPts val="1600"/>
+              </a:spcBef>
+              <a:spcAft>
+                <a:spcPts val="1600"/>
+              </a:spcAft>
+              <a:buNone/>
+            </a:pPr>
+            <a:r>
+              <a:rPr lang="en-GB" sz="2400"/>
+              <a:t>This could be done by assigning tags (e.g. “child”)</a:t>
             </a:r>
             <a:endParaRPr sz="2400"/>
           </a:p>
@@ -7660,6 +7788,127 @@
             <a:r>
               <a:rPr lang="en-GB" sz="2400"/>
               <a:t>Information about nearest accessibility points being provided based on the current location </a:t>
+            </a:r>
+            <a:endParaRPr sz="2400"/>
+          </a:p>
+          <a:p>
+            <a:pPr indent="-381000" lvl="0" marL="457200" rtl="0" algn="l">
+              <a:spcBef>
+                <a:spcPts val="0"/>
+              </a:spcBef>
+              <a:spcAft>
+                <a:spcPts val="0"/>
+              </a:spcAft>
+              <a:buSzPts val="2400"/>
+              <a:buChar char="●"/>
+            </a:pPr>
+            <a:r>
+              <a:rPr lang="en-GB" sz="2400"/>
+              <a:t>Showing your current location on the map </a:t>
+            </a:r>
+            <a:endParaRPr sz="2400"/>
+          </a:p>
+        </p:txBody>
+      </p:sp>
+    </p:spTree>
+  </p:cSld>
+  <p:clrMapOvr>
+    <a:masterClrMapping/>
+  </p:clrMapOvr>
+</p:sld>
+</file>
+
+<file path=ppt/slides/slide12.xml><?xml version="1.0" encoding="utf-8"?>
+<p:sld xmlns:a="http://schemas.openxmlformats.org/drawingml/2006/main" xmlns:r="http://schemas.openxmlformats.org/officeDocument/2006/relationships" xmlns:mc="http://schemas.openxmlformats.org/markup-compatibility/2006" xmlns:mv="urn:schemas-microsoft-com:mac:vml" xmlns:p="http://schemas.openxmlformats.org/presentationml/2006/main" xmlns:c="http://schemas.openxmlformats.org/drawingml/2006/chart" xmlns:dgm="http://schemas.openxmlformats.org/drawingml/2006/diagram" xmlns:o="urn:schemas-microsoft-com:office:office" xmlns:v="urn:schemas-microsoft-com:vml" xmlns:pvml="urn:schemas-microsoft-com:office:powerpoint" xmlns:com="http://schemas.openxmlformats.org/drawingml/2006/compatibility" xmlns:p14="http://schemas.microsoft.com/office/powerpoint/2010/main" xmlns:p15="http://schemas.microsoft.com/office/powerpoint/2012/main">
+  <p:cSld>
+    <p:spTree>
+      <p:nvGrpSpPr>
+        <p:cNvPr id="125" name="Shape 125"/>
+        <p:cNvGrpSpPr/>
+        <p:nvPr/>
+      </p:nvGrpSpPr>
+      <p:grpSpPr>
+        <a:xfrm>
+          <a:off x="0" y="0"/>
+          <a:ext cx="0" cy="0"/>
+          <a:chOff x="0" y="0"/>
+          <a:chExt cx="0" cy="0"/>
+        </a:xfrm>
+      </p:grpSpPr>
+      <p:sp>
+        <p:nvSpPr>
+          <p:cNvPr id="126" name="Google Shape;126;p24"/>
+          <p:cNvSpPr txBox="1"/>
+          <p:nvPr>
+            <p:ph type="title"/>
+          </p:nvPr>
+        </p:nvSpPr>
+        <p:spPr>
+          <a:xfrm>
+            <a:off x="311700" y="445025"/>
+            <a:ext cx="8520600" cy="623400"/>
+          </a:xfrm>
+          <a:prstGeom prst="rect">
+            <a:avLst/>
+          </a:prstGeom>
+        </p:spPr>
+        <p:txBody>
+          <a:bodyPr anchorCtr="0" anchor="t" bIns="91425" lIns="91425" spcFirstLastPara="1" rIns="91425" wrap="square" tIns="91425">
+            <a:noAutofit/>
+          </a:bodyPr>
+          <a:lstStyle/>
+          <a:p>
+            <a:pPr indent="0" lvl="0" marL="0" rtl="0" algn="l">
+              <a:spcBef>
+                <a:spcPts val="0"/>
+              </a:spcBef>
+              <a:spcAft>
+                <a:spcPts val="0"/>
+              </a:spcAft>
+              <a:buNone/>
+            </a:pPr>
+            <a:r>
+              <a:rPr lang="en-GB"/>
+              <a:t>Feasibility and extensibility </a:t>
+            </a:r>
+            <a:endParaRPr/>
+          </a:p>
+        </p:txBody>
+      </p:sp>
+      <p:sp>
+        <p:nvSpPr>
+          <p:cNvPr id="127" name="Google Shape;127;p24"/>
+          <p:cNvSpPr txBox="1"/>
+          <p:nvPr>
+            <p:ph idx="1" type="body"/>
+          </p:nvPr>
+        </p:nvSpPr>
+        <p:spPr>
+          <a:xfrm>
+            <a:off x="311700" y="1152475"/>
+            <a:ext cx="8520600" cy="3416400"/>
+          </a:xfrm>
+          <a:prstGeom prst="rect">
+            <a:avLst/>
+          </a:prstGeom>
+        </p:spPr>
+        <p:txBody>
+          <a:bodyPr anchorCtr="0" anchor="t" bIns="91425" lIns="91425" spcFirstLastPara="1" rIns="91425" wrap="square" tIns="91425">
+            <a:noAutofit/>
+          </a:bodyPr>
+          <a:lstStyle/>
+          <a:p>
+            <a:pPr indent="0" lvl="0" marL="0" rtl="0" algn="l">
+              <a:spcBef>
+                <a:spcPts val="0"/>
+              </a:spcBef>
+              <a:spcAft>
+                <a:spcPts val="1600"/>
+              </a:spcAft>
+              <a:buNone/>
+            </a:pPr>
+            <a:r>
+              <a:t/>
             </a:r>
             <a:endParaRPr sz="2400"/>
           </a:p>
@@ -8888,7 +9137,27 @@
             </a:pPr>
             <a:r>
               <a:rPr lang="en-GB" sz="1800"/>
-              <a:t>as people are already using the app, they will be more eager to provide feedback</a:t>
+              <a:t>As people are already using the app, they will be more eager to provide feedback</a:t>
+            </a:r>
+            <a:endParaRPr sz="1800"/>
+          </a:p>
+          <a:p>
+            <a:pPr indent="-342900" lvl="0" marL="457200" marR="0" rtl="0" algn="l">
+              <a:lnSpc>
+                <a:spcPct val="115000"/>
+              </a:lnSpc>
+              <a:spcBef>
+                <a:spcPts val="0"/>
+              </a:spcBef>
+              <a:spcAft>
+                <a:spcPts val="0"/>
+              </a:spcAft>
+              <a:buSzPts val="1800"/>
+              <a:buChar char="●"/>
+            </a:pPr>
+            <a:r>
+              <a:rPr lang="en-GB" sz="2400"/>
+              <a:t>Info about the exhibits could be shared to friends to promote science!</a:t>
             </a:r>
             <a:endParaRPr sz="1800"/>
           </a:p>

</xml_diff>

<commit_message>
corrected presentation with text-to-speech
</commit_message>
<xml_diff>
--- a/presentation.pptx
+++ b/presentation.pptx
@@ -20,23 +20,24 @@
     <p:sldId id="265" r:id="rId15"/>
     <p:sldId id="266" r:id="rId16"/>
     <p:sldId id="267" r:id="rId17"/>
+    <p:sldId id="268" r:id="rId18"/>
   </p:sldIdLst>
   <p:sldSz cy="5143500" cx="9144000"/>
   <p:notesSz cx="6858000" cy="9144000"/>
   <p:embeddedFontLst>
     <p:embeddedFont>
       <p:font typeface="Raleway"/>
-      <p:regular r:id="rId18"/>
-      <p:bold r:id="rId19"/>
-      <p:italic r:id="rId20"/>
-      <p:boldItalic r:id="rId21"/>
+      <p:regular r:id="rId19"/>
+      <p:bold r:id="rId20"/>
+      <p:italic r:id="rId21"/>
+      <p:boldItalic r:id="rId22"/>
     </p:embeddedFont>
     <p:embeddedFont>
       <p:font typeface="Source Sans Pro"/>
-      <p:regular r:id="rId22"/>
-      <p:bold r:id="rId23"/>
-      <p:italic r:id="rId24"/>
-      <p:boldItalic r:id="rId25"/>
+      <p:regular r:id="rId23"/>
+      <p:bold r:id="rId24"/>
+      <p:italic r:id="rId25"/>
+      <p:boldItalic r:id="rId26"/>
     </p:embeddedFont>
   </p:embeddedFontLst>
   <p:defaultTextStyle>
@@ -893,7 +894,7 @@
       </p:grpSpPr>
       <p:sp>
         <p:nvSpPr>
-          <p:cNvPr id="111" name="Google Shape;111;g655a93f9c3_0_466:notes"/>
+          <p:cNvPr id="111" name="Google Shape;111;g655a93f9c3_0_461:notes"/>
           <p:cNvSpPr/>
           <p:nvPr>
             <p:ph idx="2" type="sldImg"/>
@@ -928,7 +929,7 @@
       </p:sp>
       <p:sp>
         <p:nvSpPr>
-          <p:cNvPr id="112" name="Google Shape;112;g655a93f9c3_0_466:notes"/>
+          <p:cNvPr id="112" name="Google Shape;112;g655a93f9c3_0_461:notes"/>
           <p:cNvSpPr txBox="1"/>
           <p:nvPr>
             <p:ph idx="1" type="body"/>
@@ -959,8 +960,7 @@
               <a:buNone/>
             </a:pPr>
             <a:r>
-              <a:rPr lang="en-GB"/>
-              <a:t>we were thinking of assigning tags which will then be processed </a:t>
+              <a:t/>
             </a:r>
             <a:endParaRPr/>
           </a:p>
@@ -993,7 +993,7 @@
       </p:grpSpPr>
       <p:sp>
         <p:nvSpPr>
-          <p:cNvPr id="117" name="Google Shape;117;g655a93f9c3_0_471:notes"/>
+          <p:cNvPr id="117" name="Google Shape;117;g655a93f9c3_0_482:notes"/>
           <p:cNvSpPr/>
           <p:nvPr>
             <p:ph idx="2" type="sldImg"/>
@@ -1028,7 +1028,7 @@
       </p:sp>
       <p:sp>
         <p:nvSpPr>
-          <p:cNvPr id="118" name="Google Shape;118;g655a93f9c3_0_471:notes"/>
+          <p:cNvPr id="118" name="Google Shape;118;g655a93f9c3_0_482:notes"/>
           <p:cNvSpPr txBox="1"/>
           <p:nvPr>
             <p:ph idx="1" type="body"/>
@@ -1059,7 +1059,8 @@
               <a:buNone/>
             </a:pPr>
             <a:r>
-              <a:t/>
+              <a:rPr lang="en-GB"/>
+              <a:t>randomised </a:t>
             </a:r>
             <a:endParaRPr/>
           </a:p>
@@ -1092,7 +1093,7 @@
       </p:grpSpPr>
       <p:sp>
         <p:nvSpPr>
-          <p:cNvPr id="123" name="Google Shape;123;g655a93f9c3_0_477:notes"/>
+          <p:cNvPr id="123" name="Google Shape;123;g655a93f9c3_0_471:notes"/>
           <p:cNvSpPr/>
           <p:nvPr>
             <p:ph idx="2" type="sldImg"/>
@@ -1127,7 +1128,106 @@
       </p:sp>
       <p:sp>
         <p:nvSpPr>
-          <p:cNvPr id="124" name="Google Shape;124;g655a93f9c3_0_477:notes"/>
+          <p:cNvPr id="124" name="Google Shape;124;g655a93f9c3_0_471:notes"/>
+          <p:cNvSpPr txBox="1"/>
+          <p:nvPr>
+            <p:ph idx="1" type="body"/>
+          </p:nvPr>
+        </p:nvSpPr>
+        <p:spPr>
+          <a:xfrm>
+            <a:off x="685800" y="4343400"/>
+            <a:ext cx="5486400" cy="4114800"/>
+          </a:xfrm>
+          <a:prstGeom prst="rect">
+            <a:avLst/>
+          </a:prstGeom>
+        </p:spPr>
+        <p:txBody>
+          <a:bodyPr anchorCtr="0" anchor="t" bIns="91425" lIns="91425" spcFirstLastPara="1" rIns="91425" wrap="square" tIns="91425">
+            <a:noAutofit/>
+          </a:bodyPr>
+          <a:lstStyle/>
+          <a:p>
+            <a:pPr indent="0" lvl="0" marL="0" rtl="0" algn="l">
+              <a:spcBef>
+                <a:spcPts val="0"/>
+              </a:spcBef>
+              <a:spcAft>
+                <a:spcPts val="0"/>
+              </a:spcAft>
+              <a:buNone/>
+            </a:pPr>
+            <a:r>
+              <a:t/>
+            </a:r>
+            <a:endParaRPr/>
+          </a:p>
+        </p:txBody>
+      </p:sp>
+    </p:spTree>
+  </p:cSld>
+  <p:clrMapOvr>
+    <a:masterClrMapping/>
+  </p:clrMapOvr>
+</p:notes>
+</file>
+
+<file path=ppt/notesSlides/notesSlide13.xml><?xml version="1.0" encoding="utf-8"?>
+<p:notes xmlns:a="http://schemas.openxmlformats.org/drawingml/2006/main" xmlns:r="http://schemas.openxmlformats.org/officeDocument/2006/relationships" xmlns:mc="http://schemas.openxmlformats.org/markup-compatibility/2006" xmlns:mv="urn:schemas-microsoft-com:mac:vml" xmlns:p="http://schemas.openxmlformats.org/presentationml/2006/main" xmlns:c="http://schemas.openxmlformats.org/drawingml/2006/chart" xmlns:dgm="http://schemas.openxmlformats.org/drawingml/2006/diagram" xmlns:o="urn:schemas-microsoft-com:office:office" xmlns:v="urn:schemas-microsoft-com:vml" xmlns:pvml="urn:schemas-microsoft-com:office:powerpoint" xmlns:com="http://schemas.openxmlformats.org/drawingml/2006/compatibility" xmlns:p14="http://schemas.microsoft.com/office/powerpoint/2010/main" xmlns:p15="http://schemas.microsoft.com/office/powerpoint/2012/main" showMasterPhAnim="0" showMasterSp="0">
+  <p:cSld>
+    <p:spTree>
+      <p:nvGrpSpPr>
+        <p:cNvPr id="128" name="Shape 128"/>
+        <p:cNvGrpSpPr/>
+        <p:nvPr/>
+      </p:nvGrpSpPr>
+      <p:grpSpPr>
+        <a:xfrm>
+          <a:off x="0" y="0"/>
+          <a:ext cx="0" cy="0"/>
+          <a:chOff x="0" y="0"/>
+          <a:chExt cx="0" cy="0"/>
+        </a:xfrm>
+      </p:grpSpPr>
+      <p:sp>
+        <p:nvSpPr>
+          <p:cNvPr id="129" name="Google Shape;129;g655a93f9c3_0_477:notes"/>
+          <p:cNvSpPr/>
+          <p:nvPr>
+            <p:ph idx="2" type="sldImg"/>
+          </p:nvPr>
+        </p:nvSpPr>
+        <p:spPr>
+          <a:xfrm>
+            <a:off x="381300" y="685800"/>
+            <a:ext cx="6096000" cy="3429000"/>
+          </a:xfrm>
+          <a:custGeom>
+            <a:rect b="b" l="l" r="r" t="t"/>
+            <a:pathLst>
+              <a:path extrusionOk="0" h="120000" w="120000">
+                <a:moveTo>
+                  <a:pt x="0" y="0"/>
+                </a:moveTo>
+                <a:lnTo>
+                  <a:pt x="120000" y="0"/>
+                </a:lnTo>
+                <a:lnTo>
+                  <a:pt x="120000" y="120000"/>
+                </a:lnTo>
+                <a:lnTo>
+                  <a:pt x="0" y="120000"/>
+                </a:lnTo>
+                <a:close/>
+              </a:path>
+            </a:pathLst>
+          </a:custGeom>
+        </p:spPr>
+      </p:sp>
+      <p:sp>
+        <p:nvSpPr>
+          <p:cNvPr id="130" name="Google Shape;130;g655a93f9c3_0_477:notes"/>
           <p:cNvSpPr txBox="1"/>
           <p:nvPr>
             <p:ph idx="1" type="body"/>
@@ -1892,7 +1992,7 @@
       </p:grpSpPr>
       <p:sp>
         <p:nvSpPr>
-          <p:cNvPr id="105" name="Google Shape;105;g655a93f9c3_0_461:notes"/>
+          <p:cNvPr id="105" name="Google Shape;105;g655a93f9c3_0_466:notes"/>
           <p:cNvSpPr/>
           <p:nvPr>
             <p:ph idx="2" type="sldImg"/>
@@ -1927,7 +2027,7 @@
       </p:sp>
       <p:sp>
         <p:nvSpPr>
-          <p:cNvPr id="106" name="Google Shape;106;g655a93f9c3_0_461:notes"/>
+          <p:cNvPr id="106" name="Google Shape;106;g655a93f9c3_0_466:notes"/>
           <p:cNvSpPr txBox="1"/>
           <p:nvPr>
             <p:ph idx="1" type="body"/>
@@ -1958,7 +2058,8 @@
               <a:buNone/>
             </a:pPr>
             <a:r>
-              <a:t/>
+              <a:rPr lang="en-GB"/>
+              <a:t>we were thinking of assigning tags which will then be processed </a:t>
             </a:r>
             <a:endParaRPr/>
           </a:p>
@@ -7558,7 +7659,7 @@
             </a:pPr>
             <a:r>
               <a:rPr lang="en-GB"/>
-              <a:t>Other accessibility issues</a:t>
+              <a:t>Usage and assessment of it</a:t>
             </a:r>
             <a:endParaRPr/>
           </a:p>
@@ -7587,25 +7688,9 @@
           </a:bodyPr>
           <a:lstStyle/>
           <a:p>
-            <a:pPr indent="0" lvl="0" marL="0" rtl="0" algn="l">
-              <a:spcBef>
-                <a:spcPts val="0"/>
-              </a:spcBef>
-              <a:spcAft>
-                <a:spcPts val="0"/>
-              </a:spcAft>
-              <a:buNone/>
-            </a:pPr>
-            <a:r>
-              <a:rPr lang="en-GB" sz="2400"/>
-              <a:t>To be thought through and implemented… but </a:t>
-            </a:r>
-            <a:endParaRPr sz="2400"/>
-          </a:p>
-          <a:p>
             <a:pPr indent="-381000" lvl="0" marL="457200" rtl="0" algn="l">
               <a:spcBef>
-                <a:spcPts val="1600"/>
+                <a:spcPts val="0"/>
               </a:spcBef>
               <a:spcAft>
                 <a:spcPts val="0"/>
@@ -7615,12 +7700,36 @@
             </a:pPr>
             <a:r>
               <a:rPr lang="en-GB" sz="2400"/>
-              <a:t>Using different languages could be addressed by changing the description accordingly</a:t>
+              <a:t>Everyone can use it and is encouraged to (extra info included!) </a:t>
             </a:r>
             <a:endParaRPr sz="2400"/>
           </a:p>
           <a:p>
-            <a:pPr indent="-381000" lvl="0" marL="457200" rtl="0" algn="l">
+            <a:pPr indent="-342900" lvl="1" marL="914400" rtl="0" algn="l">
+              <a:spcBef>
+                <a:spcPts val="0"/>
+              </a:spcBef>
+              <a:spcAft>
+                <a:spcPts val="0"/>
+              </a:spcAft>
+              <a:buSzPts val="1800"/>
+              <a:buChar char="○"/>
+            </a:pPr>
+            <a:r>
+              <a:rPr lang="en-GB" sz="1800"/>
+              <a:t>W</a:t>
+            </a:r>
+            <a:r>
+              <a:rPr lang="en-GB" sz="1800"/>
+              <a:t>e can just store the usage and check how many people use the web app as the percentage of all people visiting the centre</a:t>
+            </a:r>
+            <a:endParaRPr sz="1800"/>
+          </a:p>
+          <a:p>
+            <a:pPr indent="-381000" lvl="0" marL="457200" marR="0" rtl="0" algn="l">
+              <a:lnSpc>
+                <a:spcPct val="115000"/>
+              </a:lnSpc>
               <a:spcBef>
                 <a:spcPts val="0"/>
               </a:spcBef>
@@ -7632,25 +7741,49 @@
             </a:pPr>
             <a:r>
               <a:rPr lang="en-GB" sz="2400"/>
-              <a:t>Alternative description could be shown for groups such as children so it is simplified or with more appropriate links</a:t>
+              <a:t>We can easily collect feedback by placing a link to a survey inside the app/as a QR code at the exit </a:t>
             </a:r>
             <a:endParaRPr sz="2400"/>
           </a:p>
           <a:p>
-            <a:pPr indent="0" lvl="0" marL="0" rtl="0" algn="l">
-              <a:spcBef>
-                <a:spcPts val="1600"/>
-              </a:spcBef>
-              <a:spcAft>
-                <a:spcPts val="1600"/>
-              </a:spcAft>
-              <a:buNone/>
+            <a:pPr indent="-342900" lvl="1" marL="914400" marR="0" rtl="0" algn="l">
+              <a:lnSpc>
+                <a:spcPct val="115000"/>
+              </a:lnSpc>
+              <a:spcBef>
+                <a:spcPts val="0"/>
+              </a:spcBef>
+              <a:spcAft>
+                <a:spcPts val="0"/>
+              </a:spcAft>
+              <a:buSzPts val="1800"/>
+              <a:buChar char="○"/>
+            </a:pPr>
+            <a:r>
+              <a:rPr lang="en-GB" sz="1800"/>
+              <a:t>As people are already using the app, they will be more eager to provide feedback</a:t>
+            </a:r>
+            <a:endParaRPr sz="1800"/>
+          </a:p>
+          <a:p>
+            <a:pPr indent="-342900" lvl="0" marL="457200" marR="0" rtl="0" algn="l">
+              <a:lnSpc>
+                <a:spcPct val="115000"/>
+              </a:lnSpc>
+              <a:spcBef>
+                <a:spcPts val="0"/>
+              </a:spcBef>
+              <a:spcAft>
+                <a:spcPts val="0"/>
+              </a:spcAft>
+              <a:buSzPts val="1800"/>
+              <a:buChar char="●"/>
             </a:pPr>
             <a:r>
               <a:rPr lang="en-GB" sz="2400"/>
-              <a:t>This could be done by assigning tags (e.g. “child”)</a:t>
+              <a:t>Info about the exhibits could be shared to friends to promote science!</a:t>
             </a:r>
-            <a:endParaRPr sz="2400"/>
+            <a:endParaRPr sz="1800"/>
           </a:p>
         </p:txBody>
       </p:sp>
@@ -7709,11 +7842,31 @@
               <a:spcAft>
                 <a:spcPts val="0"/>
               </a:spcAft>
+              <a:buClr>
+                <a:schemeClr val="dk2"/>
+              </a:buClr>
+              <a:buSzPts val="1100"/>
+              <a:buFont typeface="Arial"/>
               <a:buNone/>
             </a:pPr>
             <a:r>
               <a:rPr lang="en-GB"/>
-              <a:t>Requesting assistance</a:t>
+              <a:t>Other accessibility issues</a:t>
+            </a:r>
+            <a:endParaRPr/>
+          </a:p>
+          <a:p>
+            <a:pPr indent="0" lvl="0" marL="0" rtl="0" algn="l">
+              <a:spcBef>
+                <a:spcPts val="0"/>
+              </a:spcBef>
+              <a:spcAft>
+                <a:spcPts val="0"/>
+              </a:spcAft>
+              <a:buNone/>
+            </a:pPr>
+            <a:r>
+              <a:t/>
             </a:r>
             <a:endParaRPr/>
           </a:p>
@@ -7753,58 +7906,27 @@
             </a:pPr>
             <a:r>
               <a:rPr lang="en-GB" sz="2400"/>
-              <a:t>We also thought about:</a:t>
+              <a:t>You can define if </a:t>
+            </a:r>
+            <a:r>
+              <a:rPr lang="en-GB" sz="2400"/>
+              <a:t>an exhibit is certain disability friendly.</a:t>
             </a:r>
             <a:endParaRPr sz="2400"/>
           </a:p>
           <a:p>
-            <a:pPr indent="-381000" lvl="0" marL="457200" rtl="0" algn="l">
+            <a:pPr indent="0" lvl="0" marL="0" rtl="0" algn="l">
               <a:spcBef>
                 <a:spcPts val="1600"/>
               </a:spcBef>
               <a:spcAft>
-                <a:spcPts val="0"/>
-              </a:spcAft>
-              <a:buSzPts val="2400"/>
-              <a:buChar char="●"/>
+                <a:spcPts val="1600"/>
+              </a:spcAft>
+              <a:buNone/>
             </a:pPr>
             <a:r>
               <a:rPr lang="en-GB" sz="2400"/>
-              <a:t>Requesting assistance being done by scanning QR codes placed around the centre </a:t>
-            </a:r>
-            <a:endParaRPr sz="2400"/>
-          </a:p>
-          <a:p>
-            <a:pPr indent="-381000" lvl="0" marL="457200" rtl="0" algn="l">
-              <a:spcBef>
-                <a:spcPts val="0"/>
-              </a:spcBef>
-              <a:spcAft>
-                <a:spcPts val="0"/>
-              </a:spcAft>
-              <a:buSzPts val="2400"/>
-              <a:buChar char="●"/>
-            </a:pPr>
-            <a:r>
-              <a:rPr lang="en-GB" sz="2400"/>
-              <a:t>Information about nearest accessibility points being provided based on the current location </a:t>
-            </a:r>
-            <a:endParaRPr sz="2400"/>
-          </a:p>
-          <a:p>
-            <a:pPr indent="-381000" lvl="0" marL="457200" rtl="0" algn="l">
-              <a:spcBef>
-                <a:spcPts val="0"/>
-              </a:spcBef>
-              <a:spcAft>
-                <a:spcPts val="0"/>
-              </a:spcAft>
-              <a:buSzPts val="2400"/>
-              <a:buChar char="●"/>
-            </a:pPr>
-            <a:r>
-              <a:rPr lang="en-GB" sz="2400"/>
-              <a:t>Showing your current location on the map </a:t>
+              <a:t>Thus when browsing the exhibit’s info page user can see if it is suitable for them or not (for example considering epilepsy)</a:t>
             </a:r>
             <a:endParaRPr sz="2400"/>
           </a:p>
@@ -7869,6 +7991,162 @@
             </a:pPr>
             <a:r>
               <a:rPr lang="en-GB"/>
+              <a:t>Requesting assistance</a:t>
+            </a:r>
+            <a:endParaRPr/>
+          </a:p>
+        </p:txBody>
+      </p:sp>
+      <p:sp>
+        <p:nvSpPr>
+          <p:cNvPr id="127" name="Google Shape;127;p24"/>
+          <p:cNvSpPr txBox="1"/>
+          <p:nvPr>
+            <p:ph idx="1" type="body"/>
+          </p:nvPr>
+        </p:nvSpPr>
+        <p:spPr>
+          <a:xfrm>
+            <a:off x="311700" y="1152475"/>
+            <a:ext cx="8520600" cy="3416400"/>
+          </a:xfrm>
+          <a:prstGeom prst="rect">
+            <a:avLst/>
+          </a:prstGeom>
+        </p:spPr>
+        <p:txBody>
+          <a:bodyPr anchorCtr="0" anchor="t" bIns="91425" lIns="91425" spcFirstLastPara="1" rIns="91425" wrap="square" tIns="91425">
+            <a:noAutofit/>
+          </a:bodyPr>
+          <a:lstStyle/>
+          <a:p>
+            <a:pPr indent="0" lvl="0" marL="0" rtl="0" algn="l">
+              <a:spcBef>
+                <a:spcPts val="0"/>
+              </a:spcBef>
+              <a:spcAft>
+                <a:spcPts val="0"/>
+              </a:spcAft>
+              <a:buNone/>
+            </a:pPr>
+            <a:r>
+              <a:rPr lang="en-GB" sz="2400"/>
+              <a:t>We also thought about:</a:t>
+            </a:r>
+            <a:endParaRPr sz="2400"/>
+          </a:p>
+          <a:p>
+            <a:pPr indent="-381000" lvl="0" marL="457200" rtl="0" algn="l">
+              <a:spcBef>
+                <a:spcPts val="1600"/>
+              </a:spcBef>
+              <a:spcAft>
+                <a:spcPts val="0"/>
+              </a:spcAft>
+              <a:buSzPts val="2400"/>
+              <a:buChar char="●"/>
+            </a:pPr>
+            <a:r>
+              <a:rPr lang="en-GB" sz="2400"/>
+              <a:t>Requesting assistance being done by scanning QR codes placed around the centre </a:t>
+            </a:r>
+            <a:endParaRPr sz="2400"/>
+          </a:p>
+          <a:p>
+            <a:pPr indent="-381000" lvl="0" marL="457200" rtl="0" algn="l">
+              <a:spcBef>
+                <a:spcPts val="0"/>
+              </a:spcBef>
+              <a:spcAft>
+                <a:spcPts val="0"/>
+              </a:spcAft>
+              <a:buSzPts val="2400"/>
+              <a:buChar char="●"/>
+            </a:pPr>
+            <a:r>
+              <a:rPr lang="en-GB" sz="2400"/>
+              <a:t>Information about nearest accessibility points being provided based on the current location </a:t>
+            </a:r>
+            <a:endParaRPr sz="2400"/>
+          </a:p>
+          <a:p>
+            <a:pPr indent="-381000" lvl="0" marL="457200" rtl="0" algn="l">
+              <a:spcBef>
+                <a:spcPts val="0"/>
+              </a:spcBef>
+              <a:spcAft>
+                <a:spcPts val="0"/>
+              </a:spcAft>
+              <a:buSzPts val="2400"/>
+              <a:buChar char="●"/>
+            </a:pPr>
+            <a:r>
+              <a:rPr lang="en-GB" sz="2400"/>
+              <a:t>Showing your current location on the map </a:t>
+            </a:r>
+            <a:endParaRPr sz="2400"/>
+          </a:p>
+        </p:txBody>
+      </p:sp>
+    </p:spTree>
+  </p:cSld>
+  <p:clrMapOvr>
+    <a:masterClrMapping/>
+  </p:clrMapOvr>
+</p:sld>
+</file>
+
+<file path=ppt/slides/slide13.xml><?xml version="1.0" encoding="utf-8"?>
+<p:sld xmlns:a="http://schemas.openxmlformats.org/drawingml/2006/main" xmlns:r="http://schemas.openxmlformats.org/officeDocument/2006/relationships" xmlns:mc="http://schemas.openxmlformats.org/markup-compatibility/2006" xmlns:mv="urn:schemas-microsoft-com:mac:vml" xmlns:p="http://schemas.openxmlformats.org/presentationml/2006/main" xmlns:c="http://schemas.openxmlformats.org/drawingml/2006/chart" xmlns:dgm="http://schemas.openxmlformats.org/drawingml/2006/diagram" xmlns:o="urn:schemas-microsoft-com:office:office" xmlns:v="urn:schemas-microsoft-com:vml" xmlns:pvml="urn:schemas-microsoft-com:office:powerpoint" xmlns:com="http://schemas.openxmlformats.org/drawingml/2006/compatibility" xmlns:p14="http://schemas.microsoft.com/office/powerpoint/2010/main" xmlns:p15="http://schemas.microsoft.com/office/powerpoint/2012/main">
+  <p:cSld>
+    <p:spTree>
+      <p:nvGrpSpPr>
+        <p:cNvPr id="131" name="Shape 131"/>
+        <p:cNvGrpSpPr/>
+        <p:nvPr/>
+      </p:nvGrpSpPr>
+      <p:grpSpPr>
+        <a:xfrm>
+          <a:off x="0" y="0"/>
+          <a:ext cx="0" cy="0"/>
+          <a:chOff x="0" y="0"/>
+          <a:chExt cx="0" cy="0"/>
+        </a:xfrm>
+      </p:grpSpPr>
+      <p:sp>
+        <p:nvSpPr>
+          <p:cNvPr id="132" name="Google Shape;132;p25"/>
+          <p:cNvSpPr txBox="1"/>
+          <p:nvPr>
+            <p:ph type="title"/>
+          </p:nvPr>
+        </p:nvSpPr>
+        <p:spPr>
+          <a:xfrm>
+            <a:off x="311700" y="445025"/>
+            <a:ext cx="8520600" cy="623400"/>
+          </a:xfrm>
+          <a:prstGeom prst="rect">
+            <a:avLst/>
+          </a:prstGeom>
+        </p:spPr>
+        <p:txBody>
+          <a:bodyPr anchorCtr="0" anchor="t" bIns="91425" lIns="91425" spcFirstLastPara="1" rIns="91425" wrap="square" tIns="91425">
+            <a:noAutofit/>
+          </a:bodyPr>
+          <a:lstStyle/>
+          <a:p>
+            <a:pPr indent="0" lvl="0" marL="0" rtl="0" algn="l">
+              <a:spcBef>
+                <a:spcPts val="0"/>
+              </a:spcBef>
+              <a:spcAft>
+                <a:spcPts val="0"/>
+              </a:spcAft>
+              <a:buNone/>
+            </a:pPr>
+            <a:r>
+              <a:rPr lang="en-GB"/>
               <a:t>Feasibility and extensibility </a:t>
             </a:r>
             <a:endParaRPr/>
@@ -7877,7 +8155,7 @@
       </p:sp>
       <p:sp>
         <p:nvSpPr>
-          <p:cNvPr id="127" name="Google Shape;127;p24"/>
+          <p:cNvPr id="133" name="Google Shape;133;p25"/>
           <p:cNvSpPr txBox="1"/>
           <p:nvPr>
             <p:ph idx="1" type="body"/>
@@ -8127,7 +8405,7 @@
             </a:br>
             <a:r>
               <a:rPr lang="en-GB"/>
-              <a:t>(which is tailored for you btw!)</a:t>
+              <a:t>(which is tailored btw!)</a:t>
             </a:r>
             <a:endParaRPr/>
           </a:p>
@@ -8775,7 +9053,7 @@
             </a:pPr>
             <a:r>
               <a:rPr lang="en-GB" sz="2400"/>
-              <a:t>Transcript of the exhibit provided so you can easily read it!</a:t>
+              <a:t>Transcript of the exhibit provided so you can easily read it.</a:t>
             </a:r>
             <a:endParaRPr sz="2400"/>
           </a:p>
@@ -8792,7 +9070,7 @@
             </a:pPr>
             <a:r>
               <a:rPr lang="en-GB" sz="2400"/>
-              <a:t>Connect your hearing aid to your phone you can use text-to-speech!</a:t>
+              <a:t>User can connect their hearing aid to their phone they can use text-to-speech!</a:t>
             </a:r>
             <a:br>
               <a:rPr lang="en-GB" sz="2400"/>
@@ -8800,6 +9078,26 @@
             <a:r>
               <a:rPr lang="en-GB" sz="2400"/>
               <a:t>(especially nice when exhibit has some audio supplied!) </a:t>
+            </a:r>
+            <a:br>
+              <a:rPr lang="en-GB" sz="2400"/>
+            </a:br>
+            <a:endParaRPr sz="2400"/>
+          </a:p>
+          <a:p>
+            <a:pPr indent="-381000" lvl="0" marL="457200" rtl="0" algn="l">
+              <a:spcBef>
+                <a:spcPts val="0"/>
+              </a:spcBef>
+              <a:spcAft>
+                <a:spcPts val="0"/>
+              </a:spcAft>
+              <a:buSzPts val="2400"/>
+              <a:buChar char="●"/>
+            </a:pPr>
+            <a:r>
+              <a:rPr lang="en-GB" sz="2400"/>
+              <a:t>text-to-speech might be also valuable for children and dyslexic people who struggle to read longer texts)</a:t>
             </a:r>
             <a:endParaRPr sz="2400"/>
           </a:p>
@@ -9035,7 +9333,7 @@
             </a:pPr>
             <a:r>
               <a:rPr lang="en-GB"/>
-              <a:t>Usage and assessment of it</a:t>
+              <a:t>Other accessibility issues</a:t>
             </a:r>
             <a:endParaRPr/>
           </a:p>
@@ -9064,9 +9362,25 @@
           </a:bodyPr>
           <a:lstStyle/>
           <a:p>
+            <a:pPr indent="0" lvl="0" marL="0" rtl="0" algn="l">
+              <a:spcBef>
+                <a:spcPts val="0"/>
+              </a:spcBef>
+              <a:spcAft>
+                <a:spcPts val="0"/>
+              </a:spcAft>
+              <a:buNone/>
+            </a:pPr>
+            <a:r>
+              <a:rPr lang="en-GB" sz="2400"/>
+              <a:t>To be thought through and implemented… but </a:t>
+            </a:r>
+            <a:endParaRPr sz="2400"/>
+          </a:p>
+          <a:p>
             <a:pPr indent="-381000" lvl="0" marL="457200" rtl="0" algn="l">
               <a:spcBef>
-                <a:spcPts val="0"/>
+                <a:spcPts val="1600"/>
               </a:spcBef>
               <a:spcAft>
                 <a:spcPts val="0"/>
@@ -9076,36 +9390,12 @@
             </a:pPr>
             <a:r>
               <a:rPr lang="en-GB" sz="2400"/>
-              <a:t>Everyone can use it and is encouraged to (extra info included!) </a:t>
+              <a:t>Using different languages could be addressed by changing the description accordingly</a:t>
             </a:r>
             <a:endParaRPr sz="2400"/>
           </a:p>
           <a:p>
-            <a:pPr indent="-342900" lvl="1" marL="914400" rtl="0" algn="l">
-              <a:spcBef>
-                <a:spcPts val="0"/>
-              </a:spcBef>
-              <a:spcAft>
-                <a:spcPts val="0"/>
-              </a:spcAft>
-              <a:buSzPts val="1800"/>
-              <a:buChar char="○"/>
-            </a:pPr>
-            <a:r>
-              <a:rPr lang="en-GB" sz="1800"/>
-              <a:t>W</a:t>
-            </a:r>
-            <a:r>
-              <a:rPr lang="en-GB" sz="1800"/>
-              <a:t>e can just store the usage and check how many people use the web app as the percentage of all people visiting the centre</a:t>
-            </a:r>
-            <a:endParaRPr sz="1800"/>
-          </a:p>
-          <a:p>
-            <a:pPr indent="-381000" lvl="0" marL="457200" marR="0" rtl="0" algn="l">
-              <a:lnSpc>
-                <a:spcPct val="115000"/>
-              </a:lnSpc>
+            <a:pPr indent="-381000" lvl="0" marL="457200" rtl="0" algn="l">
               <a:spcBef>
                 <a:spcPts val="0"/>
               </a:spcBef>
@@ -9117,49 +9407,25 @@
             </a:pPr>
             <a:r>
               <a:rPr lang="en-GB" sz="2400"/>
-              <a:t>We can easily collect feedback by placing a link to a survey inside the app/as a QR code at the exit </a:t>
+              <a:t>Alternative description could be shown for groups such as children so it is simplified or with more appropriate links</a:t>
             </a:r>
             <a:endParaRPr sz="2400"/>
           </a:p>
           <a:p>
-            <a:pPr indent="-342900" lvl="1" marL="914400" marR="0" rtl="0" algn="l">
-              <a:lnSpc>
-                <a:spcPct val="115000"/>
-              </a:lnSpc>
-              <a:spcBef>
-                <a:spcPts val="0"/>
-              </a:spcBef>
-              <a:spcAft>
-                <a:spcPts val="0"/>
-              </a:spcAft>
-              <a:buSzPts val="1800"/>
-              <a:buChar char="○"/>
-            </a:pPr>
-            <a:r>
-              <a:rPr lang="en-GB" sz="1800"/>
-              <a:t>As people are already using the app, they will be more eager to provide feedback</a:t>
-            </a:r>
-            <a:endParaRPr sz="1800"/>
-          </a:p>
-          <a:p>
-            <a:pPr indent="-342900" lvl="0" marL="457200" marR="0" rtl="0" algn="l">
-              <a:lnSpc>
-                <a:spcPct val="115000"/>
-              </a:lnSpc>
-              <a:spcBef>
-                <a:spcPts val="0"/>
-              </a:spcBef>
-              <a:spcAft>
-                <a:spcPts val="0"/>
-              </a:spcAft>
-              <a:buSzPts val="1800"/>
-              <a:buChar char="●"/>
+            <a:pPr indent="0" lvl="0" marL="0" rtl="0" algn="l">
+              <a:spcBef>
+                <a:spcPts val="1600"/>
+              </a:spcBef>
+              <a:spcAft>
+                <a:spcPts val="1600"/>
+              </a:spcAft>
+              <a:buNone/>
             </a:pPr>
             <a:r>
               <a:rPr lang="en-GB" sz="2400"/>
-              <a:t>Info about the exhibits could be shared to friends to promote science!</a:t>
+              <a:t>This could be done by assigning tags (e.g. “child”)</a:t>
             </a:r>
-            <a:endParaRPr sz="1800"/>
+            <a:endParaRPr sz="2400"/>
           </a:p>
         </p:txBody>
       </p:sp>

</xml_diff>

<commit_message>
almost final presentation after all
</commit_message>
<xml_diff>
--- a/presentation.pptx
+++ b/presentation.pptx
@@ -964,7 +964,15 @@
               <a:buNone/>
             </a:pPr>
             <a:r>
-              <a:t/>
+              <a:rPr lang="en-GB"/>
+              <a:t>so you mentioned that people might need helpers and higher floors aren’t neccessarilly fully staffed </a:t>
+            </a:r>
+            <a:br>
+              <a:rPr lang="en-GB"/>
+            </a:br>
+            <a:r>
+              <a:rPr lang="en-GB"/>
+              <a:t>that’s when this comes in handy</a:t>
             </a:r>
             <a:endParaRPr/>
           </a:p>
@@ -1063,7 +1071,15 @@
               <a:buNone/>
             </a:pPr>
             <a:r>
-              <a:t/>
+              <a:rPr lang="en-GB"/>
+              <a:t>But we can also add some more functionality </a:t>
+            </a:r>
+            <a:br>
+              <a:rPr lang="en-GB"/>
+            </a:br>
+            <a:r>
+              <a:rPr lang="en-GB"/>
+              <a:t>helping those </a:t>
             </a:r>
             <a:endParaRPr/>
           </a:p>
@@ -1163,7 +1179,7 @@
             </a:pPr>
             <a:r>
               <a:rPr lang="en-GB"/>
-              <a:t>we were thinking of assigning tags which will then be processed </a:t>
+              <a:t>we were also thinking of assigning tags which will then be used to provide the best experience for everyone</a:t>
             </a:r>
             <a:endParaRPr/>
           </a:p>
@@ -1263,6 +1279,20 @@
             </a:pPr>
             <a:r>
               <a:rPr lang="en-GB"/>
+              <a:t>so if we can’t accommodate for everyone…. we have to let them know at least! </a:t>
+            </a:r>
+            <a:br>
+              <a:rPr lang="en-GB"/>
+            </a:br>
+            <a:r>
+              <a:rPr lang="en-GB"/>
+              <a:t>very important when it might be possibly dangerous </a:t>
+            </a:r>
+            <a:br>
+              <a:rPr lang="en-GB"/>
+            </a:br>
+            <a:r>
+              <a:rPr lang="en-GB"/>
               <a:t>randomised </a:t>
             </a:r>
             <a:endParaRPr/>
@@ -1363,7 +1393,22 @@
             </a:pPr>
             <a:r>
               <a:rPr lang="en-GB"/>
-              <a:t>we can track usage for each exhibit to see what user profile has </a:t>
+              <a:t>you mentioned struggling with assessing the </a:t>
+            </a:r>
+            <a:r>
+              <a:rPr lang="en-GB"/>
+              <a:t>successfulness</a:t>
+            </a:r>
+            <a:r>
+              <a:rPr lang="en-GB"/>
+              <a:t> of the products, here it would be rather straightforward </a:t>
+            </a:r>
+            <a:br>
+              <a:rPr lang="en-GB"/>
+            </a:br>
+            <a:r>
+              <a:rPr lang="en-GB"/>
+              <a:t>we can track usage for each exhibit to see what user profile it has </a:t>
             </a:r>
             <a:endParaRPr/>
           </a:p>
@@ -1462,7 +1507,8 @@
               <a:buNone/>
             </a:pPr>
             <a:r>
-              <a:t/>
+              <a:rPr lang="en-GB"/>
+              <a:t>could be possibly represented like this</a:t>
             </a:r>
             <a:endParaRPr/>
           </a:p>
@@ -1561,7 +1607,8 @@
               <a:buNone/>
             </a:pPr>
             <a:r>
-              <a:t/>
+              <a:rPr lang="en-GB"/>
+              <a:t>we believe our project can be easily extended and features we talked about could be implemented because of ….</a:t>
             </a:r>
             <a:endParaRPr/>
           </a:p>
@@ -1868,6 +1915,13 @@
               <a:rPr lang="en-GB"/>
               <a:t>so users will figure it out, easy!</a:t>
             </a:r>
+            <a:br>
+              <a:rPr lang="en-GB"/>
+            </a:br>
+            <a:r>
+              <a:rPr lang="en-GB"/>
+              <a:t>but we have more functionality so it’s all good but that’s the basic idea</a:t>
+            </a:r>
             <a:endParaRPr/>
           </a:p>
         </p:txBody>
@@ -1965,7 +2019,8 @@
               <a:buNone/>
             </a:pPr>
             <a:r>
-              <a:t/>
+              <a:rPr lang="en-GB"/>
+              <a:t>demo time</a:t>
             </a:r>
             <a:endParaRPr/>
           </a:p>
@@ -2163,7 +2218,8 @@
               <a:buNone/>
             </a:pPr>
             <a:r>
-              <a:t/>
+              <a:rPr lang="en-GB"/>
+              <a:t>just read I suppose</a:t>
             </a:r>
             <a:endParaRPr/>
           </a:p>
@@ -2262,7 +2318,15 @@
               <a:buNone/>
             </a:pPr>
             <a:r>
-              <a:t/>
+              <a:rPr lang="en-GB"/>
+              <a:t>we want to address struggles of both severely and mildly impaired </a:t>
+            </a:r>
+            <a:br>
+              <a:rPr lang="en-GB"/>
+            </a:br>
+            <a:r>
+              <a:rPr lang="en-GB"/>
+              <a:t>so both text and audio for those partially impaired</a:t>
             </a:r>
             <a:endParaRPr/>
           </a:p>
@@ -2361,7 +2425,24 @@
               <a:buNone/>
             </a:pPr>
             <a:r>
-              <a:t/>
+              <a:rPr lang="en-GB"/>
+              <a:t>but it doesn’t end on that, it will enhance the experience also when exhibits involve some audio tracks </a:t>
+            </a:r>
+            <a:endParaRPr/>
+          </a:p>
+          <a:p>
+            <a:pPr indent="0" lvl="0" marL="0" rtl="0" algn="l">
+              <a:spcBef>
+                <a:spcPts val="0"/>
+              </a:spcBef>
+              <a:spcAft>
+                <a:spcPts val="0"/>
+              </a:spcAft>
+              <a:buNone/>
+            </a:pPr>
+            <a:r>
+              <a:rPr lang="en-GB"/>
+              <a:t>moreover it’s suitable for other disabilities as well </a:t>
             </a:r>
             <a:endParaRPr/>
           </a:p>
@@ -2460,7 +2541,8 @@
               <a:buNone/>
             </a:pPr>
             <a:r>
-              <a:t/>
+              <a:rPr lang="en-GB"/>
+              <a:t>implementing all of it would require a bit more than 24h BUT there is a way to implement it that could make people with visual impairment </a:t>
             </a:r>
             <a:endParaRPr/>
           </a:p>
@@ -7926,7 +8008,7 @@
           </a:bodyPr>
           <a:lstStyle/>
           <a:p>
-            <a:pPr indent="0" lvl="0" marL="0" rtl="0" algn="l">
+            <a:pPr indent="0" lvl="0" marL="0" rtl="0" algn="just">
               <a:spcBef>
                 <a:spcPts val="0"/>
               </a:spcBef>
@@ -7937,7 +8019,7 @@
             </a:pPr>
             <a:r>
               <a:rPr lang="en-GB"/>
-              <a:t>By us</a:t>
+              <a:t>By Team5</a:t>
             </a:r>
             <a:endParaRPr/>
           </a:p>
@@ -8258,7 +8340,7 @@
             </a:pPr>
             <a:r>
               <a:rPr lang="en-GB" sz="2400"/>
-              <a:t>Information about nearest accessibility points being provided based on the current location </a:t>
+              <a:t>Information about nearest accessibility points being provided based on the current location.</a:t>
             </a:r>
             <a:endParaRPr sz="2400"/>
           </a:p>
@@ -8275,7 +8357,7 @@
             </a:pPr>
             <a:r>
               <a:rPr lang="en-GB" sz="2400"/>
-              <a:t>Showing your current location on a map (can be relative to exhibit id which is easily accessible through json!).</a:t>
+              <a:t>Showing your current location on a map (can be relative to exhibit ID which is easily accessible through json!).</a:t>
             </a:r>
             <a:endParaRPr sz="2400"/>
           </a:p>
@@ -8396,7 +8478,7 @@
             </a:pPr>
             <a:r>
               <a:rPr lang="en-GB" sz="2400"/>
-              <a:t>To be thought through and implemented… but </a:t>
+              <a:t>To be thought through and implemented… but;</a:t>
             </a:r>
             <a:endParaRPr sz="2400"/>
           </a:p>
@@ -8413,7 +8495,7 @@
             </a:pPr>
             <a:r>
               <a:rPr lang="en-GB" sz="2400"/>
-              <a:t>Using different languages could be addressed by changing the description accordingly</a:t>
+              <a:t>Using different languages could be addressed by changing the description accordingly.</a:t>
             </a:r>
             <a:endParaRPr sz="2400"/>
           </a:p>
@@ -8430,7 +8512,7 @@
             </a:pPr>
             <a:r>
               <a:rPr lang="en-GB" sz="2400"/>
-              <a:t>Alternative description could be shown for groups such as children so it is simplified or with more appropriate links (easily implementable through our json)</a:t>
+              <a:t>Alternative description could be shown for groups such as children so it is simplified or with more appropriate links (easily implementable through our json).</a:t>
             </a:r>
             <a:endParaRPr sz="2400"/>
           </a:p>
@@ -8446,7 +8528,7 @@
             </a:pPr>
             <a:r>
               <a:rPr lang="en-GB" sz="2400"/>
-              <a:t>This could be done by assigning tags (e.g. “child”)</a:t>
+              <a:t>This could be done by assigning tags (e.g. “child”).</a:t>
             </a:r>
             <a:endParaRPr sz="2400"/>
           </a:p>
@@ -8575,7 +8657,14 @@
             </a:r>
             <a:r>
               <a:rPr lang="en-GB" sz="2400"/>
-              <a:t>an exhibit is certain disability friendly (Also easily definable through our json!).</a:t>
+              <a:t>an exhibit is certain disability friendly </a:t>
+            </a:r>
+            <a:br>
+              <a:rPr lang="en-GB" sz="2400"/>
+            </a:br>
+            <a:r>
+              <a:rPr lang="en-GB" sz="2400"/>
+              <a:t>(Also easily definable through our json!).</a:t>
             </a:r>
             <a:endParaRPr sz="2400"/>
           </a:p>
@@ -8591,7 +8680,7 @@
             </a:pPr>
             <a:r>
               <a:rPr lang="en-GB" sz="2400"/>
-              <a:t>Thus when browsing the exhibit’s info page webapp can show if it is suitable for the user or not (for example considering epilepsy).</a:t>
+              <a:t>Thus when browsing the exhibit’s info page webapp can show if it is suitable for the user or not (for example user might want to avoid an exhibit due to epilepsy).</a:t>
             </a:r>
             <a:endParaRPr sz="2400"/>
           </a:p>
@@ -8718,7 +8807,7 @@
             </a:r>
             <a:r>
               <a:rPr lang="en-GB" sz="1800"/>
-              <a:t>e can just store the usage and check how many people use the web app as the percentage of all people visiting the centre</a:t>
+              <a:t>e can just store the usage and check how many people use the web app as the percentage of all people visiting the centre.</a:t>
             </a:r>
             <a:endParaRPr sz="1800"/>
           </a:p>
@@ -8738,7 +8827,7 @@
             </a:pPr>
             <a:r>
               <a:rPr lang="en-GB" sz="2400"/>
-              <a:t>We can easily collect feedback by placing a link to a survey inside the app/as a QR code at the exit </a:t>
+              <a:t>We can easily collect feedback by placing a link to a survey inside the app/as a QR code at the exit.</a:t>
             </a:r>
             <a:endParaRPr sz="2400"/>
           </a:p>
@@ -8758,7 +8847,7 @@
             </a:pPr>
             <a:r>
               <a:rPr lang="en-GB" sz="1800"/>
-              <a:t>As people are already using the app, they will be more eager to provide feedback</a:t>
+              <a:t>As people are already using the app, they will be more eager to provide feedback.</a:t>
             </a:r>
             <a:endParaRPr sz="1800"/>
           </a:p>
@@ -8944,7 +9033,7 @@
                 <a:cs typeface="Source Sans Pro"/>
                 <a:sym typeface="Source Sans Pro"/>
               </a:rPr>
-              <a:t>App currently has features that will allow for easy collection of such data</a:t>
+              <a:t>App currently has features that will allow for easy collection of such data.</a:t>
             </a:r>
             <a:endParaRPr>
               <a:latin typeface="Source Sans Pro"/>
@@ -9722,7 +9811,7 @@
             </a:pPr>
             <a:r>
               <a:rPr lang="en-GB"/>
-              <a:t>How to make it used and assess if enough people use i</a:t>
+              <a:t>How to make it popular and assess if enough people use i</a:t>
             </a:r>
             <a:r>
               <a:rPr lang="en-GB"/>
@@ -9794,7 +9883,7 @@
             </a:pPr>
             <a:r>
               <a:rPr lang="en-GB"/>
-              <a:t>How to provide additional support for younger people?</a:t>
+              <a:t>How to provide additional support for elderly or young adults and children?</a:t>
             </a:r>
             <a:endParaRPr/>
           </a:p>
@@ -10099,18 +10188,18 @@
             </a:br>
             <a:r>
               <a:rPr lang="en-GB" sz="1800"/>
-              <a:t>Other disabilities:</a:t>
+              <a:t>Helps other disabilities too:</a:t>
             </a:r>
             <a:br>
               <a:rPr lang="en-GB" sz="1800"/>
             </a:br>
             <a:r>
               <a:rPr lang="en-GB" sz="1800"/>
-              <a:t>t</a:t>
+              <a:t>-t</a:t>
             </a:r>
             <a:r>
               <a:rPr lang="en-GB" sz="1800"/>
-              <a:t>ext-to-speech might be also valuable for children and dyslexic people who struggle to read longer texts</a:t>
+              <a:t>ext-to-speech might be also valuable for children and people with dyslexia who struggle to read longer texts.</a:t>
             </a:r>
             <a:endParaRPr sz="1800"/>
           </a:p>
@@ -10247,7 +10336,7 @@
             </a:pPr>
             <a:r>
               <a:rPr lang="en-GB" sz="2400"/>
-              <a:t>You can open exhibit’s page and listen to the description thanks to the text-to-speech! This works!</a:t>
+              <a:t>You can open exhibit’s page and listen to the description. thanks to the text-to-speech! This works!</a:t>
             </a:r>
             <a:endParaRPr sz="2400"/>
           </a:p>
@@ -10264,7 +10353,7 @@
             </a:pPr>
             <a:r>
               <a:rPr lang="en-GB" sz="2400"/>
-              <a:t>All the changes happening on the screen could be read</a:t>
+              <a:t>All the changes happening on the screen could be read.</a:t>
             </a:r>
             <a:endParaRPr sz="2400"/>
           </a:p>
@@ -10281,7 +10370,7 @@
             </a:pPr>
             <a:r>
               <a:rPr lang="en-GB" sz="2400"/>
-              <a:t>Navigating could be implemented by voice recognition </a:t>
+              <a:t>Navigating could be implemented by voice recognition.</a:t>
             </a:r>
             <a:endParaRPr sz="2400"/>
           </a:p>
@@ -10296,6 +10385,285 @@
 </file>
 
 <file path=ppt/theme/theme1.xml><?xml version="1.0" encoding="utf-8"?>
+<a:theme xmlns:a="http://schemas.openxmlformats.org/drawingml/2006/main" xmlns:r="http://schemas.openxmlformats.org/officeDocument/2006/relationships">
+  <a:themeElements>
+    <a:clrScheme name="Default">
+      <a:dk1>
+        <a:srgbClr val="000000"/>
+      </a:dk1>
+      <a:lt1>
+        <a:srgbClr val="FFFFFF"/>
+      </a:lt1>
+      <a:dk2>
+        <a:srgbClr val="158158"/>
+      </a:dk2>
+      <a:lt2>
+        <a:srgbClr val="F3F3F3"/>
+      </a:lt2>
+      <a:accent1>
+        <a:srgbClr val="058DC7"/>
+      </a:accent1>
+      <a:accent2>
+        <a:srgbClr val="50B432"/>
+      </a:accent2>
+      <a:accent3>
+        <a:srgbClr val="ED561B"/>
+      </a:accent3>
+      <a:accent4>
+        <a:srgbClr val="EDEF00"/>
+      </a:accent4>
+      <a:accent5>
+        <a:srgbClr val="24CBE5"/>
+      </a:accent5>
+      <a:accent6>
+        <a:srgbClr val="64E572"/>
+      </a:accent6>
+      <a:hlink>
+        <a:srgbClr val="2200CC"/>
+      </a:hlink>
+      <a:folHlink>
+        <a:srgbClr val="551A8B"/>
+      </a:folHlink>
+    </a:clrScheme>
+    <a:fontScheme name="Office">
+      <a:majorFont>
+        <a:latin typeface="Arial"/>
+        <a:ea typeface=""/>
+        <a:cs typeface=""/>
+        <a:font script="Jpan" typeface="ＭＳ Ｐゴシック"/>
+        <a:font script="Hang" typeface="맑은 고딕"/>
+        <a:font script="Hans" typeface="宋体"/>
+        <a:font script="Hant" typeface="新細明體"/>
+        <a:font script="Arab" typeface="Times New Roman"/>
+        <a:font script="Hebr" typeface="Times New Roman"/>
+        <a:font script="Thai" typeface="Angsana New"/>
+        <a:font script="Ethi" typeface="Nyala"/>
+        <a:font script="Beng" typeface="Vrinda"/>
+        <a:font script="Gujr" typeface="Shruti"/>
+        <a:font script="Khmr" typeface="MoolBoran"/>
+        <a:font script="Knda" typeface="Tunga"/>
+        <a:font script="Guru" typeface="Raavi"/>
+        <a:font script="Cans" typeface="Euphemia"/>
+        <a:font script="Cher" typeface="Plantagenet Cherokee"/>
+        <a:font script="Yiii" typeface="Microsoft Yi Baiti"/>
+        <a:font script="Tibt" typeface="Microsoft Himalaya"/>
+        <a:font script="Thaa" typeface="MV Boli"/>
+        <a:font script="Deva" typeface="Mangal"/>
+        <a:font script="Telu" typeface="Gautami"/>
+        <a:font script="Taml" typeface="Latha"/>
+        <a:font script="Syrc" typeface="Estrangelo Edessa"/>
+        <a:font script="Orya" typeface="Kalinga"/>
+        <a:font script="Mlym" typeface="Kartika"/>
+        <a:font script="Laoo" typeface="DokChampa"/>
+        <a:font script="Sinh" typeface="Iskoola Pota"/>
+        <a:font script="Mong" typeface="Mongolian Baiti"/>
+        <a:font script="Viet" typeface="Times New Roman"/>
+        <a:font script="Uigh" typeface="Microsoft Uighur"/>
+        <a:font script="Geor" typeface="Sylfaen"/>
+      </a:majorFont>
+      <a:minorFont>
+        <a:latin typeface="Arial"/>
+        <a:ea typeface=""/>
+        <a:cs typeface=""/>
+        <a:font script="Jpan" typeface="ＭＳ Ｐゴシック"/>
+        <a:font script="Hang" typeface="맑은 고딕"/>
+        <a:font script="Hans" typeface="宋体"/>
+        <a:font script="Hant" typeface="新細明體"/>
+        <a:font script="Arab" typeface="Arial"/>
+        <a:font script="Hebr" typeface="Arial"/>
+        <a:font script="Thai" typeface="Cordia New"/>
+        <a:font script="Ethi" typeface="Nyala"/>
+        <a:font script="Beng" typeface="Vrinda"/>
+        <a:font script="Gujr" typeface="Shruti"/>
+        <a:font script="Khmr" typeface="DaunPenh"/>
+        <a:font script="Knda" typeface="Tunga"/>
+        <a:font script="Guru" typeface="Raavi"/>
+        <a:font script="Cans" typeface="Euphemia"/>
+        <a:font script="Cher" typeface="Plantagenet Cherokee"/>
+        <a:font script="Yiii" typeface="Microsoft Yi Baiti"/>
+        <a:font script="Tibt" typeface="Microsoft Himalaya"/>
+        <a:font script="Thaa" typeface="MV Boli"/>
+        <a:font script="Deva" typeface="Mangal"/>
+        <a:font script="Telu" typeface="Gautami"/>
+        <a:font script="Taml" typeface="Latha"/>
+        <a:font script="Syrc" typeface="Estrangelo Edessa"/>
+        <a:font script="Orya" typeface="Kalinga"/>
+        <a:font script="Mlym" typeface="Kartika"/>
+        <a:font script="Laoo" typeface="DokChampa"/>
+        <a:font script="Sinh" typeface="Iskoola Pota"/>
+        <a:font script="Mong" typeface="Mongolian Baiti"/>
+        <a:font script="Viet" typeface="Arial"/>
+        <a:font script="Uigh" typeface="Microsoft Uighur"/>
+        <a:font script="Geor" typeface="Sylfaen"/>
+      </a:minorFont>
+    </a:fontScheme>
+    <a:fmtScheme name="Office">
+      <a:fillStyleLst>
+        <a:solidFill>
+          <a:schemeClr val="phClr"/>
+        </a:solidFill>
+        <a:gradFill rotWithShape="1">
+          <a:gsLst>
+            <a:gs pos="0">
+              <a:schemeClr val="phClr">
+                <a:tint val="50000"/>
+                <a:satMod val="300000"/>
+              </a:schemeClr>
+            </a:gs>
+            <a:gs pos="35000">
+              <a:schemeClr val="phClr">
+                <a:tint val="37000"/>
+                <a:satMod val="300000"/>
+              </a:schemeClr>
+            </a:gs>
+            <a:gs pos="100000">
+              <a:schemeClr val="phClr">
+                <a:tint val="15000"/>
+                <a:satMod val="350000"/>
+              </a:schemeClr>
+            </a:gs>
+          </a:gsLst>
+          <a:lin ang="16200000" scaled="1"/>
+        </a:gradFill>
+        <a:gradFill rotWithShape="1">
+          <a:gsLst>
+            <a:gs pos="0">
+              <a:schemeClr val="phClr">
+                <a:tint val="100000"/>
+                <a:shade val="100000"/>
+                <a:satMod val="130000"/>
+              </a:schemeClr>
+            </a:gs>
+            <a:gs pos="100000">
+              <a:schemeClr val="phClr">
+                <a:tint val="50000"/>
+                <a:shade val="100000"/>
+                <a:satMod val="350000"/>
+              </a:schemeClr>
+            </a:gs>
+          </a:gsLst>
+          <a:lin ang="16200000" scaled="0"/>
+        </a:gradFill>
+      </a:fillStyleLst>
+      <a:lnStyleLst>
+        <a:ln w="9525" cap="flat" cmpd="sng" algn="ctr">
+          <a:solidFill>
+            <a:schemeClr val="phClr">
+              <a:shade val="95000"/>
+              <a:satMod val="105000"/>
+            </a:schemeClr>
+          </a:solidFill>
+          <a:prstDash val="solid"/>
+        </a:ln>
+        <a:ln w="25400" cap="flat" cmpd="sng" algn="ctr">
+          <a:solidFill>
+            <a:schemeClr val="phClr"/>
+          </a:solidFill>
+          <a:prstDash val="solid"/>
+        </a:ln>
+        <a:ln w="38100" cap="flat" cmpd="sng" algn="ctr">
+          <a:solidFill>
+            <a:schemeClr val="phClr"/>
+          </a:solidFill>
+          <a:prstDash val="solid"/>
+        </a:ln>
+      </a:lnStyleLst>
+      <a:effectStyleLst>
+        <a:effectStyle>
+          <a:effectLst>
+            <a:outerShdw blurRad="40000" dist="20000" dir="5400000" rotWithShape="0">
+              <a:srgbClr val="000000">
+                <a:alpha val="38000"/>
+              </a:srgbClr>
+            </a:outerShdw>
+          </a:effectLst>
+        </a:effectStyle>
+        <a:effectStyle>
+          <a:effectLst>
+            <a:outerShdw blurRad="40000" dist="23000" dir="5400000" rotWithShape="0">
+              <a:srgbClr val="000000">
+                <a:alpha val="35000"/>
+              </a:srgbClr>
+            </a:outerShdw>
+          </a:effectLst>
+        </a:effectStyle>
+        <a:effectStyle>
+          <a:effectLst>
+            <a:outerShdw blurRad="40000" dist="23000" dir="5400000" rotWithShape="0">
+              <a:srgbClr val="000000">
+                <a:alpha val="35000"/>
+              </a:srgbClr>
+            </a:outerShdw>
+          </a:effectLst>
+          <a:scene3d>
+            <a:camera prst="orthographicFront">
+              <a:rot lat="0" lon="0" rev="0"/>
+            </a:camera>
+            <a:lightRig rig="threePt" dir="t">
+              <a:rot lat="0" lon="0" rev="1200000"/>
+            </a:lightRig>
+          </a:scene3d>
+          <a:sp3d>
+            <a:bevelT w="63500" h="25400"/>
+          </a:sp3d>
+        </a:effectStyle>
+      </a:effectStyleLst>
+      <a:bgFillStyleLst>
+        <a:solidFill>
+          <a:schemeClr val="phClr"/>
+        </a:solidFill>
+        <a:gradFill rotWithShape="1">
+          <a:gsLst>
+            <a:gs pos="0">
+              <a:schemeClr val="phClr">
+                <a:tint val="40000"/>
+                <a:satMod val="350000"/>
+              </a:schemeClr>
+            </a:gs>
+            <a:gs pos="40000">
+              <a:schemeClr val="phClr">
+                <a:tint val="45000"/>
+                <a:shade val="99000"/>
+                <a:satMod val="350000"/>
+              </a:schemeClr>
+            </a:gs>
+            <a:gs pos="100000">
+              <a:schemeClr val="phClr">
+                <a:shade val="20000"/>
+                <a:satMod val="255000"/>
+              </a:schemeClr>
+            </a:gs>
+          </a:gsLst>
+          <a:path path="circle">
+            <a:fillToRect l="50000" t="-80000" r="50000" b="180000"/>
+          </a:path>
+        </a:gradFill>
+        <a:gradFill rotWithShape="1">
+          <a:gsLst>
+            <a:gs pos="0">
+              <a:schemeClr val="phClr">
+                <a:tint val="80000"/>
+                <a:satMod val="300000"/>
+              </a:schemeClr>
+            </a:gs>
+            <a:gs pos="100000">
+              <a:schemeClr val="phClr">
+                <a:shade val="30000"/>
+                <a:satMod val="200000"/>
+              </a:schemeClr>
+            </a:gs>
+          </a:gsLst>
+          <a:path path="circle">
+            <a:fillToRect l="50000" t="50000" r="50000" b="50000"/>
+          </a:path>
+        </a:gradFill>
+      </a:bgFillStyleLst>
+    </a:fmtScheme>
+  </a:themeElements>
+</a:theme>
+</file>
+
+<file path=ppt/theme/theme2.xml><?xml version="1.0" encoding="utf-8"?>
 <a:theme xmlns:a="http://schemas.openxmlformats.org/drawingml/2006/main" xmlns:r="http://schemas.openxmlformats.org/officeDocument/2006/relationships" name="Plum">
   <a:themeElements>
     <a:clrScheme name="Plum">
@@ -10572,283 +10940,4 @@
     </a:fmtScheme>
   </a:themeElements>
 </a:theme>
-</file>
-
-<file path=ppt/theme/theme2.xml><?xml version="1.0" encoding="utf-8"?>
-<a:theme xmlns:a="http://schemas.openxmlformats.org/drawingml/2006/main" xmlns:r="http://schemas.openxmlformats.org/officeDocument/2006/relationships">
-  <a:themeElements>
-    <a:clrScheme name="Default">
-      <a:dk1>
-        <a:srgbClr val="000000"/>
-      </a:dk1>
-      <a:lt1>
-        <a:srgbClr val="FFFFFF"/>
-      </a:lt1>
-      <a:dk2>
-        <a:srgbClr val="158158"/>
-      </a:dk2>
-      <a:lt2>
-        <a:srgbClr val="F3F3F3"/>
-      </a:lt2>
-      <a:accent1>
-        <a:srgbClr val="058DC7"/>
-      </a:accent1>
-      <a:accent2>
-        <a:srgbClr val="50B432"/>
-      </a:accent2>
-      <a:accent3>
-        <a:srgbClr val="ED561B"/>
-      </a:accent3>
-      <a:accent4>
-        <a:srgbClr val="EDEF00"/>
-      </a:accent4>
-      <a:accent5>
-        <a:srgbClr val="24CBE5"/>
-      </a:accent5>
-      <a:accent6>
-        <a:srgbClr val="64E572"/>
-      </a:accent6>
-      <a:hlink>
-        <a:srgbClr val="2200CC"/>
-      </a:hlink>
-      <a:folHlink>
-        <a:srgbClr val="551A8B"/>
-      </a:folHlink>
-    </a:clrScheme>
-    <a:fontScheme name="Office">
-      <a:majorFont>
-        <a:latin typeface="Arial"/>
-        <a:ea typeface=""/>
-        <a:cs typeface=""/>
-        <a:font script="Jpan" typeface="ＭＳ Ｐゴシック"/>
-        <a:font script="Hang" typeface="맑은 고딕"/>
-        <a:font script="Hans" typeface="宋体"/>
-        <a:font script="Hant" typeface="新細明體"/>
-        <a:font script="Arab" typeface="Times New Roman"/>
-        <a:font script="Hebr" typeface="Times New Roman"/>
-        <a:font script="Thai" typeface="Angsana New"/>
-        <a:font script="Ethi" typeface="Nyala"/>
-        <a:font script="Beng" typeface="Vrinda"/>
-        <a:font script="Gujr" typeface="Shruti"/>
-        <a:font script="Khmr" typeface="MoolBoran"/>
-        <a:font script="Knda" typeface="Tunga"/>
-        <a:font script="Guru" typeface="Raavi"/>
-        <a:font script="Cans" typeface="Euphemia"/>
-        <a:font script="Cher" typeface="Plantagenet Cherokee"/>
-        <a:font script="Yiii" typeface="Microsoft Yi Baiti"/>
-        <a:font script="Tibt" typeface="Microsoft Himalaya"/>
-        <a:font script="Thaa" typeface="MV Boli"/>
-        <a:font script="Deva" typeface="Mangal"/>
-        <a:font script="Telu" typeface="Gautami"/>
-        <a:font script="Taml" typeface="Latha"/>
-        <a:font script="Syrc" typeface="Estrangelo Edessa"/>
-        <a:font script="Orya" typeface="Kalinga"/>
-        <a:font script="Mlym" typeface="Kartika"/>
-        <a:font script="Laoo" typeface="DokChampa"/>
-        <a:font script="Sinh" typeface="Iskoola Pota"/>
-        <a:font script="Mong" typeface="Mongolian Baiti"/>
-        <a:font script="Viet" typeface="Times New Roman"/>
-        <a:font script="Uigh" typeface="Microsoft Uighur"/>
-        <a:font script="Geor" typeface="Sylfaen"/>
-      </a:majorFont>
-      <a:minorFont>
-        <a:latin typeface="Arial"/>
-        <a:ea typeface=""/>
-        <a:cs typeface=""/>
-        <a:font script="Jpan" typeface="ＭＳ Ｐゴシック"/>
-        <a:font script="Hang" typeface="맑은 고딕"/>
-        <a:font script="Hans" typeface="宋体"/>
-        <a:font script="Hant" typeface="新細明體"/>
-        <a:font script="Arab" typeface="Arial"/>
-        <a:font script="Hebr" typeface="Arial"/>
-        <a:font script="Thai" typeface="Cordia New"/>
-        <a:font script="Ethi" typeface="Nyala"/>
-        <a:font script="Beng" typeface="Vrinda"/>
-        <a:font script="Gujr" typeface="Shruti"/>
-        <a:font script="Khmr" typeface="DaunPenh"/>
-        <a:font script="Knda" typeface="Tunga"/>
-        <a:font script="Guru" typeface="Raavi"/>
-        <a:font script="Cans" typeface="Euphemia"/>
-        <a:font script="Cher" typeface="Plantagenet Cherokee"/>
-        <a:font script="Yiii" typeface="Microsoft Yi Baiti"/>
-        <a:font script="Tibt" typeface="Microsoft Himalaya"/>
-        <a:font script="Thaa" typeface="MV Boli"/>
-        <a:font script="Deva" typeface="Mangal"/>
-        <a:font script="Telu" typeface="Gautami"/>
-        <a:font script="Taml" typeface="Latha"/>
-        <a:font script="Syrc" typeface="Estrangelo Edessa"/>
-        <a:font script="Orya" typeface="Kalinga"/>
-        <a:font script="Mlym" typeface="Kartika"/>
-        <a:font script="Laoo" typeface="DokChampa"/>
-        <a:font script="Sinh" typeface="Iskoola Pota"/>
-        <a:font script="Mong" typeface="Mongolian Baiti"/>
-        <a:font script="Viet" typeface="Arial"/>
-        <a:font script="Uigh" typeface="Microsoft Uighur"/>
-        <a:font script="Geor" typeface="Sylfaen"/>
-      </a:minorFont>
-    </a:fontScheme>
-    <a:fmtScheme name="Office">
-      <a:fillStyleLst>
-        <a:solidFill>
-          <a:schemeClr val="phClr"/>
-        </a:solidFill>
-        <a:gradFill rotWithShape="1">
-          <a:gsLst>
-            <a:gs pos="0">
-              <a:schemeClr val="phClr">
-                <a:tint val="50000"/>
-                <a:satMod val="300000"/>
-              </a:schemeClr>
-            </a:gs>
-            <a:gs pos="35000">
-              <a:schemeClr val="phClr">
-                <a:tint val="37000"/>
-                <a:satMod val="300000"/>
-              </a:schemeClr>
-            </a:gs>
-            <a:gs pos="100000">
-              <a:schemeClr val="phClr">
-                <a:tint val="15000"/>
-                <a:satMod val="350000"/>
-              </a:schemeClr>
-            </a:gs>
-          </a:gsLst>
-          <a:lin ang="16200000" scaled="1"/>
-        </a:gradFill>
-        <a:gradFill rotWithShape="1">
-          <a:gsLst>
-            <a:gs pos="0">
-              <a:schemeClr val="phClr">
-                <a:tint val="100000"/>
-                <a:shade val="100000"/>
-                <a:satMod val="130000"/>
-              </a:schemeClr>
-            </a:gs>
-            <a:gs pos="100000">
-              <a:schemeClr val="phClr">
-                <a:tint val="50000"/>
-                <a:shade val="100000"/>
-                <a:satMod val="350000"/>
-              </a:schemeClr>
-            </a:gs>
-          </a:gsLst>
-          <a:lin ang="16200000" scaled="0"/>
-        </a:gradFill>
-      </a:fillStyleLst>
-      <a:lnStyleLst>
-        <a:ln w="9525" cap="flat" cmpd="sng" algn="ctr">
-          <a:solidFill>
-            <a:schemeClr val="phClr">
-              <a:shade val="95000"/>
-              <a:satMod val="105000"/>
-            </a:schemeClr>
-          </a:solidFill>
-          <a:prstDash val="solid"/>
-        </a:ln>
-        <a:ln w="25400" cap="flat" cmpd="sng" algn="ctr">
-          <a:solidFill>
-            <a:schemeClr val="phClr"/>
-          </a:solidFill>
-          <a:prstDash val="solid"/>
-        </a:ln>
-        <a:ln w="38100" cap="flat" cmpd="sng" algn="ctr">
-          <a:solidFill>
-            <a:schemeClr val="phClr"/>
-          </a:solidFill>
-          <a:prstDash val="solid"/>
-        </a:ln>
-      </a:lnStyleLst>
-      <a:effectStyleLst>
-        <a:effectStyle>
-          <a:effectLst>
-            <a:outerShdw blurRad="40000" dist="20000" dir="5400000" rotWithShape="0">
-              <a:srgbClr val="000000">
-                <a:alpha val="38000"/>
-              </a:srgbClr>
-            </a:outerShdw>
-          </a:effectLst>
-        </a:effectStyle>
-        <a:effectStyle>
-          <a:effectLst>
-            <a:outerShdw blurRad="40000" dist="23000" dir="5400000" rotWithShape="0">
-              <a:srgbClr val="000000">
-                <a:alpha val="35000"/>
-              </a:srgbClr>
-            </a:outerShdw>
-          </a:effectLst>
-        </a:effectStyle>
-        <a:effectStyle>
-          <a:effectLst>
-            <a:outerShdw blurRad="40000" dist="23000" dir="5400000" rotWithShape="0">
-              <a:srgbClr val="000000">
-                <a:alpha val="35000"/>
-              </a:srgbClr>
-            </a:outerShdw>
-          </a:effectLst>
-          <a:scene3d>
-            <a:camera prst="orthographicFront">
-              <a:rot lat="0" lon="0" rev="0"/>
-            </a:camera>
-            <a:lightRig rig="threePt" dir="t">
-              <a:rot lat="0" lon="0" rev="1200000"/>
-            </a:lightRig>
-          </a:scene3d>
-          <a:sp3d>
-            <a:bevelT w="63500" h="25400"/>
-          </a:sp3d>
-        </a:effectStyle>
-      </a:effectStyleLst>
-      <a:bgFillStyleLst>
-        <a:solidFill>
-          <a:schemeClr val="phClr"/>
-        </a:solidFill>
-        <a:gradFill rotWithShape="1">
-          <a:gsLst>
-            <a:gs pos="0">
-              <a:schemeClr val="phClr">
-                <a:tint val="40000"/>
-                <a:satMod val="350000"/>
-              </a:schemeClr>
-            </a:gs>
-            <a:gs pos="40000">
-              <a:schemeClr val="phClr">
-                <a:tint val="45000"/>
-                <a:shade val="99000"/>
-                <a:satMod val="350000"/>
-              </a:schemeClr>
-            </a:gs>
-            <a:gs pos="100000">
-              <a:schemeClr val="phClr">
-                <a:shade val="20000"/>
-                <a:satMod val="255000"/>
-              </a:schemeClr>
-            </a:gs>
-          </a:gsLst>
-          <a:path path="circle">
-            <a:fillToRect l="50000" t="-80000" r="50000" b="180000"/>
-          </a:path>
-        </a:gradFill>
-        <a:gradFill rotWithShape="1">
-          <a:gsLst>
-            <a:gs pos="0">
-              <a:schemeClr val="phClr">
-                <a:tint val="80000"/>
-                <a:satMod val="300000"/>
-              </a:schemeClr>
-            </a:gs>
-            <a:gs pos="100000">
-              <a:schemeClr val="phClr">
-                <a:shade val="30000"/>
-                <a:satMod val="200000"/>
-              </a:schemeClr>
-            </a:gs>
-          </a:gsLst>
-          <a:path path="circle">
-            <a:fillToRect l="50000" t="50000" r="50000" b="50000"/>
-          </a:path>
-        </a:gradFill>
-      </a:bgFillStyleLst>
-    </a:fmtScheme>
-  </a:themeElements>
-</a:theme>
 </file>
</xml_diff>